<commit_message>
Se actualiza la carta gantt
</commit_message>
<xml_diff>
--- a/Fase 1/Evidencias Grupales/Presentación Proyecto.pptx
+++ b/Fase 1/Evidencias Grupales/Presentación Proyecto.pptx
@@ -256,7 +256,7 @@
   </p:defaultTextStyle>
   <p:extLst>
     <p:ext uri="GoogleSlidesCustomDataVersion2">
-      <go:slidesCustomData xmlns:go="http://customooxmlschemas.google.com/" r:id="rId14" roundtripDataSignature="AMtx7mgJcyPJDZcAxkM1c994RqTPGvpsXA=="/>
+      <go:slidesCustomData xmlns:go="http://customooxmlschemas.google.com/" r:id="rId14" roundtripDataSignature="AMtx7mjciq7F2ZbWL0aBdal0DO+gswecqw=="/>
     </p:ext>
   </p:extLst>
 </p:presentation>
@@ -891,7 +891,7 @@
   <p:cSld>
     <p:spTree>
       <p:nvGrpSpPr>
-        <p:cNvPr id="167" name="Shape 167"/>
+        <p:cNvPr id="173" name="Shape 173"/>
         <p:cNvGrpSpPr/>
         <p:nvPr/>
       </p:nvGrpSpPr>
@@ -905,7 +905,7 @@
       </p:grpSpPr>
       <p:sp>
         <p:nvSpPr>
-          <p:cNvPr id="168" name="Google Shape;168;p3:notes"/>
+          <p:cNvPr id="174" name="Google Shape;174;p3:notes"/>
           <p:cNvSpPr txBox="1"/>
           <p:nvPr>
             <p:ph idx="1" type="body"/>
@@ -944,7 +944,7 @@
       </p:sp>
       <p:sp>
         <p:nvSpPr>
-          <p:cNvPr id="169" name="Google Shape;169;p3:notes"/>
+          <p:cNvPr id="175" name="Google Shape;175;p3:notes"/>
           <p:cNvSpPr/>
           <p:nvPr>
             <p:ph idx="2" type="sldImg"/>
@@ -990,7 +990,7 @@
   <p:cSld>
     <p:spTree>
       <p:nvGrpSpPr>
-        <p:cNvPr id="178" name="Shape 178"/>
+        <p:cNvPr id="184" name="Shape 184"/>
         <p:cNvGrpSpPr/>
         <p:nvPr/>
       </p:nvGrpSpPr>
@@ -1004,7 +1004,7 @@
       </p:grpSpPr>
       <p:sp>
         <p:nvSpPr>
-          <p:cNvPr id="179" name="Google Shape;179;p4:notes"/>
+          <p:cNvPr id="185" name="Google Shape;185;p4:notes"/>
           <p:cNvSpPr txBox="1"/>
           <p:nvPr>
             <p:ph idx="1" type="body"/>
@@ -1043,7 +1043,7 @@
       </p:sp>
       <p:sp>
         <p:nvSpPr>
-          <p:cNvPr id="180" name="Google Shape;180;p4:notes"/>
+          <p:cNvPr id="186" name="Google Shape;186;p4:notes"/>
           <p:cNvSpPr/>
           <p:nvPr>
             <p:ph idx="2" type="sldImg"/>
@@ -1089,7 +1089,7 @@
   <p:cSld>
     <p:spTree>
       <p:nvGrpSpPr>
-        <p:cNvPr id="189" name="Shape 189"/>
+        <p:cNvPr id="195" name="Shape 195"/>
         <p:cNvGrpSpPr/>
         <p:nvPr/>
       </p:nvGrpSpPr>
@@ -1103,7 +1103,7 @@
       </p:grpSpPr>
       <p:sp>
         <p:nvSpPr>
-          <p:cNvPr id="190" name="Google Shape;190;p5:notes"/>
+          <p:cNvPr id="196" name="Google Shape;196;p5:notes"/>
           <p:cNvSpPr txBox="1"/>
           <p:nvPr>
             <p:ph idx="1" type="body"/>
@@ -1142,7 +1142,7 @@
       </p:sp>
       <p:sp>
         <p:nvSpPr>
-          <p:cNvPr id="191" name="Google Shape;191;p5:notes"/>
+          <p:cNvPr id="197" name="Google Shape;197;p5:notes"/>
           <p:cNvSpPr/>
           <p:nvPr>
             <p:ph idx="2" type="sldImg"/>
@@ -16621,7 +16621,7 @@
         </p:nvGrpSpPr>
         <p:grpSpPr>
           <a:xfrm>
-            <a:off x="1288106" y="1925901"/>
+            <a:off x="1286818" y="1925901"/>
             <a:ext cx="9618381" cy="4350553"/>
             <a:chOff x="0" y="0"/>
             <a:chExt cx="9618381" cy="4350553"/>
@@ -17952,6 +17952,216 @@
           </a:ln>
         </p:spPr>
       </p:cxnSp>
+      <p:pic>
+        <p:nvPicPr>
+          <p:cNvPr id="167" name="Google Shape;167;p2"/>
+          <p:cNvPicPr preferRelativeResize="0"/>
+          <p:nvPr/>
+        </p:nvPicPr>
+        <p:blipFill>
+          <a:blip r:embed="rId4">
+            <a:alphaModFix/>
+          </a:blip>
+          <a:stretch>
+            <a:fillRect/>
+          </a:stretch>
+        </p:blipFill>
+        <p:spPr>
+          <a:xfrm>
+            <a:off x="1830175" y="2078650"/>
+            <a:ext cx="1153400" cy="1077250"/>
+          </a:xfrm>
+          <a:prstGeom prst="rect">
+            <a:avLst/>
+          </a:prstGeom>
+          <a:noFill/>
+          <a:ln>
+            <a:noFill/>
+          </a:ln>
+        </p:spPr>
+      </p:pic>
+      <p:sp>
+        <p:nvSpPr>
+          <p:cNvPr id="168" name="Google Shape;168;p2"/>
+          <p:cNvSpPr txBox="1"/>
+          <p:nvPr/>
+        </p:nvSpPr>
+        <p:spPr>
+          <a:xfrm>
+            <a:off x="1830174" y="2078639"/>
+            <a:ext cx="716400" cy="471000"/>
+          </a:xfrm>
+          <a:prstGeom prst="rect">
+            <a:avLst/>
+          </a:prstGeom>
+          <a:noFill/>
+          <a:ln>
+            <a:noFill/>
+          </a:ln>
+        </p:spPr>
+        <p:txBody>
+          <a:bodyPr anchorCtr="0" anchor="ctr" bIns="21850" lIns="21850" spcFirstLastPara="1" rIns="21850" wrap="square" tIns="21850">
+            <a:noAutofit/>
+          </a:bodyPr>
+          <a:lstStyle/>
+          <a:p>
+            <a:pPr indent="0" lvl="0" marL="0" rtl="0" algn="l">
+              <a:spcBef>
+                <a:spcPts val="0"/>
+              </a:spcBef>
+              <a:spcAft>
+                <a:spcPts val="0"/>
+              </a:spcAft>
+              <a:buNone/>
+            </a:pPr>
+            <a:r>
+              <a:rPr lang="es-CL" sz="334"/>
+              <a:t> </a:t>
+            </a:r>
+            <a:endParaRPr sz="334"/>
+          </a:p>
+        </p:txBody>
+      </p:sp>
+      <p:pic>
+        <p:nvPicPr>
+          <p:cNvPr id="169" name="Google Shape;169;p2"/>
+          <p:cNvPicPr preferRelativeResize="0"/>
+          <p:nvPr/>
+        </p:nvPicPr>
+        <p:blipFill>
+          <a:blip r:embed="rId5">
+            <a:alphaModFix/>
+          </a:blip>
+          <a:stretch>
+            <a:fillRect/>
+          </a:stretch>
+        </p:blipFill>
+        <p:spPr>
+          <a:xfrm>
+            <a:off x="1830175" y="3562550"/>
+            <a:ext cx="1153400" cy="1077250"/>
+          </a:xfrm>
+          <a:prstGeom prst="rect">
+            <a:avLst/>
+          </a:prstGeom>
+          <a:noFill/>
+          <a:ln>
+            <a:noFill/>
+          </a:ln>
+        </p:spPr>
+      </p:pic>
+      <p:sp>
+        <p:nvSpPr>
+          <p:cNvPr id="170" name="Google Shape;170;p2"/>
+          <p:cNvSpPr txBox="1"/>
+          <p:nvPr/>
+        </p:nvSpPr>
+        <p:spPr>
+          <a:xfrm>
+            <a:off x="1830181" y="3656306"/>
+            <a:ext cx="504600" cy="504600"/>
+          </a:xfrm>
+          <a:prstGeom prst="rect">
+            <a:avLst/>
+          </a:prstGeom>
+          <a:noFill/>
+          <a:ln>
+            <a:noFill/>
+          </a:ln>
+        </p:spPr>
+        <p:txBody>
+          <a:bodyPr anchorCtr="0" anchor="ctr" bIns="15375" lIns="15375" spcFirstLastPara="1" rIns="15375" wrap="square" tIns="15375">
+            <a:noAutofit/>
+          </a:bodyPr>
+          <a:lstStyle/>
+          <a:p>
+            <a:pPr indent="0" lvl="0" marL="0" rtl="0" algn="l">
+              <a:spcBef>
+                <a:spcPts val="0"/>
+              </a:spcBef>
+              <a:spcAft>
+                <a:spcPts val="0"/>
+              </a:spcAft>
+              <a:buNone/>
+            </a:pPr>
+            <a:r>
+              <a:rPr lang="es-CL" sz="235"/>
+              <a:t> </a:t>
+            </a:r>
+            <a:endParaRPr sz="235"/>
+          </a:p>
+        </p:txBody>
+      </p:sp>
+      <p:pic>
+        <p:nvPicPr>
+          <p:cNvPr id="171" name="Google Shape;171;p2"/>
+          <p:cNvPicPr preferRelativeResize="0"/>
+          <p:nvPr/>
+        </p:nvPicPr>
+        <p:blipFill>
+          <a:blip r:embed="rId6">
+            <a:alphaModFix/>
+          </a:blip>
+          <a:stretch>
+            <a:fillRect/>
+          </a:stretch>
+        </p:blipFill>
+        <p:spPr>
+          <a:xfrm>
+            <a:off x="1830175" y="5046449"/>
+            <a:ext cx="1153400" cy="1077250"/>
+          </a:xfrm>
+          <a:prstGeom prst="rect">
+            <a:avLst/>
+          </a:prstGeom>
+          <a:noFill/>
+          <a:ln>
+            <a:noFill/>
+          </a:ln>
+        </p:spPr>
+      </p:pic>
+      <p:sp>
+        <p:nvSpPr>
+          <p:cNvPr id="172" name="Google Shape;172;p2"/>
+          <p:cNvSpPr txBox="1"/>
+          <p:nvPr/>
+        </p:nvSpPr>
+        <p:spPr>
+          <a:xfrm>
+            <a:off x="1864161" y="5070387"/>
+            <a:ext cx="669000" cy="471300"/>
+          </a:xfrm>
+          <a:prstGeom prst="rect">
+            <a:avLst/>
+          </a:prstGeom>
+          <a:noFill/>
+          <a:ln>
+            <a:noFill/>
+          </a:ln>
+        </p:spPr>
+        <p:txBody>
+          <a:bodyPr anchorCtr="0" anchor="ctr" bIns="20400" lIns="20400" spcFirstLastPara="1" rIns="20400" wrap="square" tIns="20400">
+            <a:noAutofit/>
+          </a:bodyPr>
+          <a:lstStyle/>
+          <a:p>
+            <a:pPr indent="0" lvl="0" marL="0" rtl="0" algn="l">
+              <a:spcBef>
+                <a:spcPts val="0"/>
+              </a:spcBef>
+              <a:spcAft>
+                <a:spcPts val="0"/>
+              </a:spcAft>
+              <a:buNone/>
+            </a:pPr>
+            <a:r>
+              <a:rPr lang="es-CL" sz="312"/>
+              <a:t> </a:t>
+            </a:r>
+            <a:endParaRPr sz="312"/>
+          </a:p>
+        </p:txBody>
+      </p:sp>
     </p:spTree>
   </p:cSld>
   <p:clrMapOvr>
@@ -17968,7 +18178,7 @@
   <p:cSld>
     <p:spTree>
       <p:nvGrpSpPr>
-        <p:cNvPr id="170" name="Shape 170"/>
+        <p:cNvPr id="176" name="Shape 176"/>
         <p:cNvGrpSpPr/>
         <p:nvPr/>
       </p:nvGrpSpPr>
@@ -17982,7 +18192,7 @@
       </p:grpSpPr>
       <p:pic>
         <p:nvPicPr>
-          <p:cNvPr descr="EscuelaIT Duoc UC - Escuela de Informática y Telecomunicaciones Duoc UC - Duoc  UC | LinkedIn" id="171" name="Google Shape;171;p3"/>
+          <p:cNvPr descr="EscuelaIT Duoc UC - Escuela de Informática y Telecomunicaciones Duoc UC - Duoc  UC | LinkedIn" id="177" name="Google Shape;177;p3"/>
           <p:cNvPicPr preferRelativeResize="0"/>
           <p:nvPr/>
         </p:nvPicPr>
@@ -18009,7 +18219,7 @@
       </p:pic>
       <p:sp>
         <p:nvSpPr>
-          <p:cNvPr id="172" name="Google Shape;172;p3"/>
+          <p:cNvPr id="178" name="Google Shape;178;p3"/>
           <p:cNvSpPr txBox="1"/>
           <p:nvPr/>
         </p:nvSpPr>
@@ -18067,7 +18277,7 @@
       </p:sp>
       <p:sp>
         <p:nvSpPr>
-          <p:cNvPr id="173" name="Google Shape;173;p3"/>
+          <p:cNvPr id="179" name="Google Shape;179;p3"/>
           <p:cNvSpPr txBox="1"/>
           <p:nvPr/>
         </p:nvSpPr>
@@ -18125,7 +18335,7 @@
       </p:sp>
       <p:cxnSp>
         <p:nvCxnSpPr>
-          <p:cNvPr id="174" name="Google Shape;174;p3"/>
+          <p:cNvPr id="180" name="Google Shape;180;p3"/>
           <p:cNvCxnSpPr/>
           <p:nvPr/>
         </p:nvCxnSpPr>
@@ -18151,7 +18361,7 @@
       </p:cxnSp>
       <p:sp>
         <p:nvSpPr>
-          <p:cNvPr id="175" name="Google Shape;175;p3"/>
+          <p:cNvPr id="181" name="Google Shape;181;p3"/>
           <p:cNvSpPr/>
           <p:nvPr/>
         </p:nvSpPr>
@@ -18266,7 +18476,7 @@
       </p:sp>
       <p:sp>
         <p:nvSpPr>
-          <p:cNvPr id="176" name="Google Shape;176;p3"/>
+          <p:cNvPr id="182" name="Google Shape;182;p3"/>
           <p:cNvSpPr/>
           <p:nvPr/>
         </p:nvSpPr>
@@ -18326,7 +18536,7 @@
       </p:sp>
       <p:sp>
         <p:nvSpPr>
-          <p:cNvPr id="177" name="Google Shape;177;p3"/>
+          <p:cNvPr id="183" name="Google Shape;183;p3"/>
           <p:cNvSpPr/>
           <p:nvPr/>
         </p:nvSpPr>
@@ -18481,7 +18691,7 @@
                                           </p:stCondLst>
                                         </p:cTn>
                                         <p:tgtEl>
-                                          <p:spTgt spid="175"/>
+                                          <p:spTgt spid="181"/>
                                         </p:tgtEl>
                                         <p:attrNameLst>
                                           <p:attrName>style.visibility</p:attrName>
@@ -18495,7 +18705,7 @@
                                       <p:cBhvr>
                                         <p:cTn dur="500"/>
                                         <p:tgtEl>
-                                          <p:spTgt spid="175"/>
+                                          <p:spTgt spid="181"/>
                                         </p:tgtEl>
                                       </p:cBhvr>
                                     </p:animEffect>
@@ -18534,7 +18744,7 @@
                                           </p:stCondLst>
                                         </p:cTn>
                                         <p:tgtEl>
-                                          <p:spTgt spid="176"/>
+                                          <p:spTgt spid="182"/>
                                         </p:tgtEl>
                                         <p:attrNameLst>
                                           <p:attrName>style.visibility</p:attrName>
@@ -18548,7 +18758,7 @@
                                       <p:cBhvr>
                                         <p:cTn dur="500"/>
                                         <p:tgtEl>
-                                          <p:spTgt spid="176"/>
+                                          <p:spTgt spid="182"/>
                                         </p:tgtEl>
                                       </p:cBhvr>
                                     </p:animEffect>
@@ -18569,7 +18779,7 @@
                                           </p:stCondLst>
                                         </p:cTn>
                                         <p:tgtEl>
-                                          <p:spTgt spid="177"/>
+                                          <p:spTgt spid="183"/>
                                         </p:tgtEl>
                                         <p:attrNameLst>
                                           <p:attrName>style.visibility</p:attrName>
@@ -18583,7 +18793,7 @@
                                       <p:cBhvr>
                                         <p:cTn dur="500"/>
                                         <p:tgtEl>
-                                          <p:spTgt spid="177"/>
+                                          <p:spTgt spid="183"/>
                                         </p:tgtEl>
                                       </p:cBhvr>
                                     </p:animEffect>
@@ -18626,7 +18836,7 @@
   <p:cSld>
     <p:spTree>
       <p:nvGrpSpPr>
-        <p:cNvPr id="181" name="Shape 181"/>
+        <p:cNvPr id="187" name="Shape 187"/>
         <p:cNvGrpSpPr/>
         <p:nvPr/>
       </p:nvGrpSpPr>
@@ -18640,7 +18850,7 @@
       </p:grpSpPr>
       <p:pic>
         <p:nvPicPr>
-          <p:cNvPr descr="EscuelaIT Duoc UC - Escuela de Informática y Telecomunicaciones Duoc UC - Duoc  UC | LinkedIn" id="182" name="Google Shape;182;p4"/>
+          <p:cNvPr descr="EscuelaIT Duoc UC - Escuela de Informática y Telecomunicaciones Duoc UC - Duoc  UC | LinkedIn" id="188" name="Google Shape;188;p4"/>
           <p:cNvPicPr preferRelativeResize="0"/>
           <p:nvPr/>
         </p:nvPicPr>
@@ -18667,7 +18877,7 @@
       </p:pic>
       <p:sp>
         <p:nvSpPr>
-          <p:cNvPr id="183" name="Google Shape;183;p4"/>
+          <p:cNvPr id="189" name="Google Shape;189;p4"/>
           <p:cNvSpPr txBox="1"/>
           <p:nvPr/>
         </p:nvSpPr>
@@ -18725,7 +18935,7 @@
       </p:sp>
       <p:sp>
         <p:nvSpPr>
-          <p:cNvPr id="184" name="Google Shape;184;p4"/>
+          <p:cNvPr id="190" name="Google Shape;190;p4"/>
           <p:cNvSpPr txBox="1"/>
           <p:nvPr/>
         </p:nvSpPr>
@@ -18783,7 +18993,7 @@
       </p:sp>
       <p:cxnSp>
         <p:nvCxnSpPr>
-          <p:cNvPr id="185" name="Google Shape;185;p4"/>
+          <p:cNvPr id="191" name="Google Shape;191;p4"/>
           <p:cNvCxnSpPr/>
           <p:nvPr/>
         </p:nvCxnSpPr>
@@ -18809,7 +19019,7 @@
       </p:cxnSp>
       <p:sp>
         <p:nvSpPr>
-          <p:cNvPr id="186" name="Google Shape;186;p4"/>
+          <p:cNvPr id="192" name="Google Shape;192;p4"/>
           <p:cNvSpPr txBox="1"/>
           <p:nvPr/>
         </p:nvSpPr>
@@ -18867,7 +19077,7 @@
       </p:sp>
       <p:sp>
         <p:nvSpPr>
-          <p:cNvPr id="187" name="Google Shape;187;p4"/>
+          <p:cNvPr id="193" name="Google Shape;193;p4"/>
           <p:cNvSpPr/>
           <p:nvPr/>
         </p:nvSpPr>
@@ -18935,7 +19145,7 @@
       </p:sp>
       <p:sp>
         <p:nvSpPr>
-          <p:cNvPr id="188" name="Google Shape;188;p4"/>
+          <p:cNvPr id="194" name="Google Shape;194;p4"/>
           <p:cNvSpPr/>
           <p:nvPr/>
         </p:nvSpPr>
@@ -19288,7 +19498,7 @@
                                           </p:stCondLst>
                                         </p:cTn>
                                         <p:tgtEl>
-                                          <p:spTgt spid="186"/>
+                                          <p:spTgt spid="192"/>
                                         </p:tgtEl>
                                         <p:attrNameLst>
                                           <p:attrName>style.visibility</p:attrName>
@@ -19302,7 +19512,7 @@
                                       <p:cBhvr>
                                         <p:cTn dur="500"/>
                                         <p:tgtEl>
-                                          <p:spTgt spid="186"/>
+                                          <p:spTgt spid="192"/>
                                         </p:tgtEl>
                                       </p:cBhvr>
                                     </p:animEffect>
@@ -19323,7 +19533,7 @@
                                           </p:stCondLst>
                                         </p:cTn>
                                         <p:tgtEl>
-                                          <p:spTgt spid="188"/>
+                                          <p:spTgt spid="194"/>
                                         </p:tgtEl>
                                         <p:attrNameLst>
                                           <p:attrName>style.visibility</p:attrName>
@@ -19337,7 +19547,7 @@
                                       <p:cBhvr>
                                         <p:cTn dur="500"/>
                                         <p:tgtEl>
-                                          <p:spTgt spid="188"/>
+                                          <p:spTgt spid="194"/>
                                         </p:tgtEl>
                                       </p:cBhvr>
                                     </p:animEffect>
@@ -19380,7 +19590,7 @@
   <p:cSld>
     <p:spTree>
       <p:nvGrpSpPr>
-        <p:cNvPr id="192" name="Shape 192"/>
+        <p:cNvPr id="198" name="Shape 198"/>
         <p:cNvGrpSpPr/>
         <p:nvPr/>
       </p:nvGrpSpPr>
@@ -19394,7 +19604,7 @@
       </p:grpSpPr>
       <p:pic>
         <p:nvPicPr>
-          <p:cNvPr descr="EscuelaIT Duoc UC - Escuela de Informática y Telecomunicaciones Duoc UC - Duoc  UC | LinkedIn" id="193" name="Google Shape;193;p5"/>
+          <p:cNvPr descr="EscuelaIT Duoc UC - Escuela de Informática y Telecomunicaciones Duoc UC - Duoc  UC | LinkedIn" id="199" name="Google Shape;199;p5"/>
           <p:cNvPicPr preferRelativeResize="0"/>
           <p:nvPr/>
         </p:nvPicPr>
@@ -19421,7 +19631,7 @@
       </p:pic>
       <p:sp>
         <p:nvSpPr>
-          <p:cNvPr id="194" name="Google Shape;194;p5"/>
+          <p:cNvPr id="200" name="Google Shape;200;p5"/>
           <p:cNvSpPr txBox="1"/>
           <p:nvPr/>
         </p:nvSpPr>
@@ -19456,7 +19666,7 @@
             <a:r>
               <a:rPr lang="es-CL" sz="1800">
                 <a:solidFill>
-                  <a:srgbClr val="0E282A"/>
+                  <a:schemeClr val="lt1"/>
                 </a:solidFill>
                 <a:latin typeface="Century Gothic"/>
                 <a:ea typeface="Century Gothic"/>
@@ -19467,7 +19677,7 @@
             </a:r>
             <a:endParaRPr sz="1800">
               <a:solidFill>
-                <a:srgbClr val="0E282A"/>
+                <a:schemeClr val="lt1"/>
               </a:solidFill>
               <a:latin typeface="Century Gothic"/>
               <a:ea typeface="Century Gothic"/>
@@ -19479,13 +19689,13 @@
       </p:sp>
       <p:sp>
         <p:nvSpPr>
-          <p:cNvPr id="195" name="Google Shape;195;p5"/>
+          <p:cNvPr id="201" name="Google Shape;201;p5"/>
           <p:cNvSpPr txBox="1"/>
           <p:nvPr/>
         </p:nvSpPr>
         <p:spPr>
           <a:xfrm>
-            <a:off x="1" y="777806"/>
+            <a:off x="-91049" y="455006"/>
             <a:ext cx="12192000" cy="800400"/>
           </a:xfrm>
           <a:prstGeom prst="rect">
@@ -19552,7 +19762,7 @@
       </p:sp>
       <p:cxnSp>
         <p:nvCxnSpPr>
-          <p:cNvPr id="196" name="Google Shape;196;p5"/>
+          <p:cNvPr id="202" name="Google Shape;202;p5"/>
           <p:cNvCxnSpPr/>
           <p:nvPr/>
         </p:nvCxnSpPr>
@@ -19578,7 +19788,7 @@
       </p:cxnSp>
       <p:pic>
         <p:nvPicPr>
-          <p:cNvPr id="197" name="Google Shape;197;p5"/>
+          <p:cNvPr id="203" name="Google Shape;203;p5"/>
           <p:cNvPicPr preferRelativeResize="0"/>
           <p:nvPr/>
         </p:nvPicPr>
@@ -19592,8 +19802,8 @@
         </p:blipFill>
         <p:spPr>
           <a:xfrm>
-            <a:off x="2704566" y="1429112"/>
-            <a:ext cx="6646125" cy="5108650"/>
+            <a:off x="1961475" y="1255400"/>
+            <a:ext cx="8269050" cy="5268799"/>
           </a:xfrm>
           <a:prstGeom prst="rect">
             <a:avLst/>
@@ -19616,6 +19826,285 @@
 </file>
 
 <file path=ppt/theme/theme1.xml><?xml version="1.0" encoding="utf-8"?>
+<a:theme xmlns:a="http://schemas.openxmlformats.org/drawingml/2006/main" xmlns:r="http://schemas.openxmlformats.org/officeDocument/2006/relationships">
+  <a:themeElements>
+    <a:clrScheme name="Default">
+      <a:dk1>
+        <a:srgbClr val="000000"/>
+      </a:dk1>
+      <a:lt1>
+        <a:srgbClr val="FFFFFF"/>
+      </a:lt1>
+      <a:dk2>
+        <a:srgbClr val="158158"/>
+      </a:dk2>
+      <a:lt2>
+        <a:srgbClr val="F3F3F3"/>
+      </a:lt2>
+      <a:accent1>
+        <a:srgbClr val="058DC7"/>
+      </a:accent1>
+      <a:accent2>
+        <a:srgbClr val="50B432"/>
+      </a:accent2>
+      <a:accent3>
+        <a:srgbClr val="ED561B"/>
+      </a:accent3>
+      <a:accent4>
+        <a:srgbClr val="EDEF00"/>
+      </a:accent4>
+      <a:accent5>
+        <a:srgbClr val="24CBE5"/>
+      </a:accent5>
+      <a:accent6>
+        <a:srgbClr val="64E572"/>
+      </a:accent6>
+      <a:hlink>
+        <a:srgbClr val="2200CC"/>
+      </a:hlink>
+      <a:folHlink>
+        <a:srgbClr val="551A8B"/>
+      </a:folHlink>
+    </a:clrScheme>
+    <a:fontScheme name="Office">
+      <a:majorFont>
+        <a:latin typeface="Arial"/>
+        <a:ea typeface=""/>
+        <a:cs typeface=""/>
+        <a:font script="Jpan" typeface="ＭＳ Ｐゴシック"/>
+        <a:font script="Hang" typeface="맑은 고딕"/>
+        <a:font script="Hans" typeface="宋体"/>
+        <a:font script="Hant" typeface="新細明體"/>
+        <a:font script="Arab" typeface="Times New Roman"/>
+        <a:font script="Hebr" typeface="Times New Roman"/>
+        <a:font script="Thai" typeface="Angsana New"/>
+        <a:font script="Ethi" typeface="Nyala"/>
+        <a:font script="Beng" typeface="Vrinda"/>
+        <a:font script="Gujr" typeface="Shruti"/>
+        <a:font script="Khmr" typeface="MoolBoran"/>
+        <a:font script="Knda" typeface="Tunga"/>
+        <a:font script="Guru" typeface="Raavi"/>
+        <a:font script="Cans" typeface="Euphemia"/>
+        <a:font script="Cher" typeface="Plantagenet Cherokee"/>
+        <a:font script="Yiii" typeface="Microsoft Yi Baiti"/>
+        <a:font script="Tibt" typeface="Microsoft Himalaya"/>
+        <a:font script="Thaa" typeface="MV Boli"/>
+        <a:font script="Deva" typeface="Mangal"/>
+        <a:font script="Telu" typeface="Gautami"/>
+        <a:font script="Taml" typeface="Latha"/>
+        <a:font script="Syrc" typeface="Estrangelo Edessa"/>
+        <a:font script="Orya" typeface="Kalinga"/>
+        <a:font script="Mlym" typeface="Kartika"/>
+        <a:font script="Laoo" typeface="DokChampa"/>
+        <a:font script="Sinh" typeface="Iskoola Pota"/>
+        <a:font script="Mong" typeface="Mongolian Baiti"/>
+        <a:font script="Viet" typeface="Times New Roman"/>
+        <a:font script="Uigh" typeface="Microsoft Uighur"/>
+        <a:font script="Geor" typeface="Sylfaen"/>
+      </a:majorFont>
+      <a:minorFont>
+        <a:latin typeface="Arial"/>
+        <a:ea typeface=""/>
+        <a:cs typeface=""/>
+        <a:font script="Jpan" typeface="ＭＳ Ｐゴシック"/>
+        <a:font script="Hang" typeface="맑은 고딕"/>
+        <a:font script="Hans" typeface="宋体"/>
+        <a:font script="Hant" typeface="新細明體"/>
+        <a:font script="Arab" typeface="Arial"/>
+        <a:font script="Hebr" typeface="Arial"/>
+        <a:font script="Thai" typeface="Cordia New"/>
+        <a:font script="Ethi" typeface="Nyala"/>
+        <a:font script="Beng" typeface="Vrinda"/>
+        <a:font script="Gujr" typeface="Shruti"/>
+        <a:font script="Khmr" typeface="DaunPenh"/>
+        <a:font script="Knda" typeface="Tunga"/>
+        <a:font script="Guru" typeface="Raavi"/>
+        <a:font script="Cans" typeface="Euphemia"/>
+        <a:font script="Cher" typeface="Plantagenet Cherokee"/>
+        <a:font script="Yiii" typeface="Microsoft Yi Baiti"/>
+        <a:font script="Tibt" typeface="Microsoft Himalaya"/>
+        <a:font script="Thaa" typeface="MV Boli"/>
+        <a:font script="Deva" typeface="Mangal"/>
+        <a:font script="Telu" typeface="Gautami"/>
+        <a:font script="Taml" typeface="Latha"/>
+        <a:font script="Syrc" typeface="Estrangelo Edessa"/>
+        <a:font script="Orya" typeface="Kalinga"/>
+        <a:font script="Mlym" typeface="Kartika"/>
+        <a:font script="Laoo" typeface="DokChampa"/>
+        <a:font script="Sinh" typeface="Iskoola Pota"/>
+        <a:font script="Mong" typeface="Mongolian Baiti"/>
+        <a:font script="Viet" typeface="Arial"/>
+        <a:font script="Uigh" typeface="Microsoft Uighur"/>
+        <a:font script="Geor" typeface="Sylfaen"/>
+      </a:minorFont>
+    </a:fontScheme>
+    <a:fmtScheme name="Office">
+      <a:fillStyleLst>
+        <a:solidFill>
+          <a:schemeClr val="phClr"/>
+        </a:solidFill>
+        <a:gradFill rotWithShape="1">
+          <a:gsLst>
+            <a:gs pos="0">
+              <a:schemeClr val="phClr">
+                <a:tint val="50000"/>
+                <a:satMod val="300000"/>
+              </a:schemeClr>
+            </a:gs>
+            <a:gs pos="35000">
+              <a:schemeClr val="phClr">
+                <a:tint val="37000"/>
+                <a:satMod val="300000"/>
+              </a:schemeClr>
+            </a:gs>
+            <a:gs pos="100000">
+              <a:schemeClr val="phClr">
+                <a:tint val="15000"/>
+                <a:satMod val="350000"/>
+              </a:schemeClr>
+            </a:gs>
+          </a:gsLst>
+          <a:lin ang="16200000" scaled="1"/>
+        </a:gradFill>
+        <a:gradFill rotWithShape="1">
+          <a:gsLst>
+            <a:gs pos="0">
+              <a:schemeClr val="phClr">
+                <a:tint val="100000"/>
+                <a:shade val="100000"/>
+                <a:satMod val="130000"/>
+              </a:schemeClr>
+            </a:gs>
+            <a:gs pos="100000">
+              <a:schemeClr val="phClr">
+                <a:tint val="50000"/>
+                <a:shade val="100000"/>
+                <a:satMod val="350000"/>
+              </a:schemeClr>
+            </a:gs>
+          </a:gsLst>
+          <a:lin ang="16200000" scaled="0"/>
+        </a:gradFill>
+      </a:fillStyleLst>
+      <a:lnStyleLst>
+        <a:ln w="9525" cap="flat" cmpd="sng" algn="ctr">
+          <a:solidFill>
+            <a:schemeClr val="phClr">
+              <a:shade val="95000"/>
+              <a:satMod val="105000"/>
+            </a:schemeClr>
+          </a:solidFill>
+          <a:prstDash val="solid"/>
+        </a:ln>
+        <a:ln w="25400" cap="flat" cmpd="sng" algn="ctr">
+          <a:solidFill>
+            <a:schemeClr val="phClr"/>
+          </a:solidFill>
+          <a:prstDash val="solid"/>
+        </a:ln>
+        <a:ln w="38100" cap="flat" cmpd="sng" algn="ctr">
+          <a:solidFill>
+            <a:schemeClr val="phClr"/>
+          </a:solidFill>
+          <a:prstDash val="solid"/>
+        </a:ln>
+      </a:lnStyleLst>
+      <a:effectStyleLst>
+        <a:effectStyle>
+          <a:effectLst>
+            <a:outerShdw blurRad="40000" dist="20000" dir="5400000" rotWithShape="0">
+              <a:srgbClr val="000000">
+                <a:alpha val="38000"/>
+              </a:srgbClr>
+            </a:outerShdw>
+          </a:effectLst>
+        </a:effectStyle>
+        <a:effectStyle>
+          <a:effectLst>
+            <a:outerShdw blurRad="40000" dist="23000" dir="5400000" rotWithShape="0">
+              <a:srgbClr val="000000">
+                <a:alpha val="35000"/>
+              </a:srgbClr>
+            </a:outerShdw>
+          </a:effectLst>
+        </a:effectStyle>
+        <a:effectStyle>
+          <a:effectLst>
+            <a:outerShdw blurRad="40000" dist="23000" dir="5400000" rotWithShape="0">
+              <a:srgbClr val="000000">
+                <a:alpha val="35000"/>
+              </a:srgbClr>
+            </a:outerShdw>
+          </a:effectLst>
+          <a:scene3d>
+            <a:camera prst="orthographicFront">
+              <a:rot lat="0" lon="0" rev="0"/>
+            </a:camera>
+            <a:lightRig rig="threePt" dir="t">
+              <a:rot lat="0" lon="0" rev="1200000"/>
+            </a:lightRig>
+          </a:scene3d>
+          <a:sp3d>
+            <a:bevelT w="63500" h="25400"/>
+          </a:sp3d>
+        </a:effectStyle>
+      </a:effectStyleLst>
+      <a:bgFillStyleLst>
+        <a:solidFill>
+          <a:schemeClr val="phClr"/>
+        </a:solidFill>
+        <a:gradFill rotWithShape="1">
+          <a:gsLst>
+            <a:gs pos="0">
+              <a:schemeClr val="phClr">
+                <a:tint val="40000"/>
+                <a:satMod val="350000"/>
+              </a:schemeClr>
+            </a:gs>
+            <a:gs pos="40000">
+              <a:schemeClr val="phClr">
+                <a:tint val="45000"/>
+                <a:shade val="99000"/>
+                <a:satMod val="350000"/>
+              </a:schemeClr>
+            </a:gs>
+            <a:gs pos="100000">
+              <a:schemeClr val="phClr">
+                <a:shade val="20000"/>
+                <a:satMod val="255000"/>
+              </a:schemeClr>
+            </a:gs>
+          </a:gsLst>
+          <a:path path="circle">
+            <a:fillToRect l="50000" t="-80000" r="50000" b="180000"/>
+          </a:path>
+        </a:gradFill>
+        <a:gradFill rotWithShape="1">
+          <a:gsLst>
+            <a:gs pos="0">
+              <a:schemeClr val="phClr">
+                <a:tint val="80000"/>
+                <a:satMod val="300000"/>
+              </a:schemeClr>
+            </a:gs>
+            <a:gs pos="100000">
+              <a:schemeClr val="phClr">
+                <a:shade val="30000"/>
+                <a:satMod val="200000"/>
+              </a:schemeClr>
+            </a:gs>
+          </a:gsLst>
+          <a:path path="circle">
+            <a:fillToRect l="50000" t="50000" r="50000" b="50000"/>
+          </a:path>
+        </a:gradFill>
+      </a:bgFillStyleLst>
+    </a:fmtScheme>
+  </a:themeElements>
+</a:theme>
+</file>
+
+<file path=ppt/theme/theme2.xml><?xml version="1.0" encoding="utf-8"?>
 <a:theme xmlns:a="http://schemas.openxmlformats.org/drawingml/2006/main" xmlns:r="http://schemas.openxmlformats.org/officeDocument/2006/relationships" name="Ion">
   <a:themeElements>
     <a:clrScheme name="Ion">
@@ -19892,283 +20381,4 @@
     </a:fmtScheme>
   </a:themeElements>
 </a:theme>
-</file>
-
-<file path=ppt/theme/theme2.xml><?xml version="1.0" encoding="utf-8"?>
-<a:theme xmlns:a="http://schemas.openxmlformats.org/drawingml/2006/main" xmlns:r="http://schemas.openxmlformats.org/officeDocument/2006/relationships">
-  <a:themeElements>
-    <a:clrScheme name="Default">
-      <a:dk1>
-        <a:srgbClr val="000000"/>
-      </a:dk1>
-      <a:lt1>
-        <a:srgbClr val="FFFFFF"/>
-      </a:lt1>
-      <a:dk2>
-        <a:srgbClr val="158158"/>
-      </a:dk2>
-      <a:lt2>
-        <a:srgbClr val="F3F3F3"/>
-      </a:lt2>
-      <a:accent1>
-        <a:srgbClr val="058DC7"/>
-      </a:accent1>
-      <a:accent2>
-        <a:srgbClr val="50B432"/>
-      </a:accent2>
-      <a:accent3>
-        <a:srgbClr val="ED561B"/>
-      </a:accent3>
-      <a:accent4>
-        <a:srgbClr val="EDEF00"/>
-      </a:accent4>
-      <a:accent5>
-        <a:srgbClr val="24CBE5"/>
-      </a:accent5>
-      <a:accent6>
-        <a:srgbClr val="64E572"/>
-      </a:accent6>
-      <a:hlink>
-        <a:srgbClr val="2200CC"/>
-      </a:hlink>
-      <a:folHlink>
-        <a:srgbClr val="551A8B"/>
-      </a:folHlink>
-    </a:clrScheme>
-    <a:fontScheme name="Office">
-      <a:majorFont>
-        <a:latin typeface="Arial"/>
-        <a:ea typeface=""/>
-        <a:cs typeface=""/>
-        <a:font script="Jpan" typeface="ＭＳ Ｐゴシック"/>
-        <a:font script="Hang" typeface="맑은 고딕"/>
-        <a:font script="Hans" typeface="宋体"/>
-        <a:font script="Hant" typeface="新細明體"/>
-        <a:font script="Arab" typeface="Times New Roman"/>
-        <a:font script="Hebr" typeface="Times New Roman"/>
-        <a:font script="Thai" typeface="Angsana New"/>
-        <a:font script="Ethi" typeface="Nyala"/>
-        <a:font script="Beng" typeface="Vrinda"/>
-        <a:font script="Gujr" typeface="Shruti"/>
-        <a:font script="Khmr" typeface="MoolBoran"/>
-        <a:font script="Knda" typeface="Tunga"/>
-        <a:font script="Guru" typeface="Raavi"/>
-        <a:font script="Cans" typeface="Euphemia"/>
-        <a:font script="Cher" typeface="Plantagenet Cherokee"/>
-        <a:font script="Yiii" typeface="Microsoft Yi Baiti"/>
-        <a:font script="Tibt" typeface="Microsoft Himalaya"/>
-        <a:font script="Thaa" typeface="MV Boli"/>
-        <a:font script="Deva" typeface="Mangal"/>
-        <a:font script="Telu" typeface="Gautami"/>
-        <a:font script="Taml" typeface="Latha"/>
-        <a:font script="Syrc" typeface="Estrangelo Edessa"/>
-        <a:font script="Orya" typeface="Kalinga"/>
-        <a:font script="Mlym" typeface="Kartika"/>
-        <a:font script="Laoo" typeface="DokChampa"/>
-        <a:font script="Sinh" typeface="Iskoola Pota"/>
-        <a:font script="Mong" typeface="Mongolian Baiti"/>
-        <a:font script="Viet" typeface="Times New Roman"/>
-        <a:font script="Uigh" typeface="Microsoft Uighur"/>
-        <a:font script="Geor" typeface="Sylfaen"/>
-      </a:majorFont>
-      <a:minorFont>
-        <a:latin typeface="Arial"/>
-        <a:ea typeface=""/>
-        <a:cs typeface=""/>
-        <a:font script="Jpan" typeface="ＭＳ Ｐゴシック"/>
-        <a:font script="Hang" typeface="맑은 고딕"/>
-        <a:font script="Hans" typeface="宋体"/>
-        <a:font script="Hant" typeface="新細明體"/>
-        <a:font script="Arab" typeface="Arial"/>
-        <a:font script="Hebr" typeface="Arial"/>
-        <a:font script="Thai" typeface="Cordia New"/>
-        <a:font script="Ethi" typeface="Nyala"/>
-        <a:font script="Beng" typeface="Vrinda"/>
-        <a:font script="Gujr" typeface="Shruti"/>
-        <a:font script="Khmr" typeface="DaunPenh"/>
-        <a:font script="Knda" typeface="Tunga"/>
-        <a:font script="Guru" typeface="Raavi"/>
-        <a:font script="Cans" typeface="Euphemia"/>
-        <a:font script="Cher" typeface="Plantagenet Cherokee"/>
-        <a:font script="Yiii" typeface="Microsoft Yi Baiti"/>
-        <a:font script="Tibt" typeface="Microsoft Himalaya"/>
-        <a:font script="Thaa" typeface="MV Boli"/>
-        <a:font script="Deva" typeface="Mangal"/>
-        <a:font script="Telu" typeface="Gautami"/>
-        <a:font script="Taml" typeface="Latha"/>
-        <a:font script="Syrc" typeface="Estrangelo Edessa"/>
-        <a:font script="Orya" typeface="Kalinga"/>
-        <a:font script="Mlym" typeface="Kartika"/>
-        <a:font script="Laoo" typeface="DokChampa"/>
-        <a:font script="Sinh" typeface="Iskoola Pota"/>
-        <a:font script="Mong" typeface="Mongolian Baiti"/>
-        <a:font script="Viet" typeface="Arial"/>
-        <a:font script="Uigh" typeface="Microsoft Uighur"/>
-        <a:font script="Geor" typeface="Sylfaen"/>
-      </a:minorFont>
-    </a:fontScheme>
-    <a:fmtScheme name="Office">
-      <a:fillStyleLst>
-        <a:solidFill>
-          <a:schemeClr val="phClr"/>
-        </a:solidFill>
-        <a:gradFill rotWithShape="1">
-          <a:gsLst>
-            <a:gs pos="0">
-              <a:schemeClr val="phClr">
-                <a:tint val="50000"/>
-                <a:satMod val="300000"/>
-              </a:schemeClr>
-            </a:gs>
-            <a:gs pos="35000">
-              <a:schemeClr val="phClr">
-                <a:tint val="37000"/>
-                <a:satMod val="300000"/>
-              </a:schemeClr>
-            </a:gs>
-            <a:gs pos="100000">
-              <a:schemeClr val="phClr">
-                <a:tint val="15000"/>
-                <a:satMod val="350000"/>
-              </a:schemeClr>
-            </a:gs>
-          </a:gsLst>
-          <a:lin ang="16200000" scaled="1"/>
-        </a:gradFill>
-        <a:gradFill rotWithShape="1">
-          <a:gsLst>
-            <a:gs pos="0">
-              <a:schemeClr val="phClr">
-                <a:tint val="100000"/>
-                <a:shade val="100000"/>
-                <a:satMod val="130000"/>
-              </a:schemeClr>
-            </a:gs>
-            <a:gs pos="100000">
-              <a:schemeClr val="phClr">
-                <a:tint val="50000"/>
-                <a:shade val="100000"/>
-                <a:satMod val="350000"/>
-              </a:schemeClr>
-            </a:gs>
-          </a:gsLst>
-          <a:lin ang="16200000" scaled="0"/>
-        </a:gradFill>
-      </a:fillStyleLst>
-      <a:lnStyleLst>
-        <a:ln w="9525" cap="flat" cmpd="sng" algn="ctr">
-          <a:solidFill>
-            <a:schemeClr val="phClr">
-              <a:shade val="95000"/>
-              <a:satMod val="105000"/>
-            </a:schemeClr>
-          </a:solidFill>
-          <a:prstDash val="solid"/>
-        </a:ln>
-        <a:ln w="25400" cap="flat" cmpd="sng" algn="ctr">
-          <a:solidFill>
-            <a:schemeClr val="phClr"/>
-          </a:solidFill>
-          <a:prstDash val="solid"/>
-        </a:ln>
-        <a:ln w="38100" cap="flat" cmpd="sng" algn="ctr">
-          <a:solidFill>
-            <a:schemeClr val="phClr"/>
-          </a:solidFill>
-          <a:prstDash val="solid"/>
-        </a:ln>
-      </a:lnStyleLst>
-      <a:effectStyleLst>
-        <a:effectStyle>
-          <a:effectLst>
-            <a:outerShdw blurRad="40000" dist="20000" dir="5400000" rotWithShape="0">
-              <a:srgbClr val="000000">
-                <a:alpha val="38000"/>
-              </a:srgbClr>
-            </a:outerShdw>
-          </a:effectLst>
-        </a:effectStyle>
-        <a:effectStyle>
-          <a:effectLst>
-            <a:outerShdw blurRad="40000" dist="23000" dir="5400000" rotWithShape="0">
-              <a:srgbClr val="000000">
-                <a:alpha val="35000"/>
-              </a:srgbClr>
-            </a:outerShdw>
-          </a:effectLst>
-        </a:effectStyle>
-        <a:effectStyle>
-          <a:effectLst>
-            <a:outerShdw blurRad="40000" dist="23000" dir="5400000" rotWithShape="0">
-              <a:srgbClr val="000000">
-                <a:alpha val="35000"/>
-              </a:srgbClr>
-            </a:outerShdw>
-          </a:effectLst>
-          <a:scene3d>
-            <a:camera prst="orthographicFront">
-              <a:rot lat="0" lon="0" rev="0"/>
-            </a:camera>
-            <a:lightRig rig="threePt" dir="t">
-              <a:rot lat="0" lon="0" rev="1200000"/>
-            </a:lightRig>
-          </a:scene3d>
-          <a:sp3d>
-            <a:bevelT w="63500" h="25400"/>
-          </a:sp3d>
-        </a:effectStyle>
-      </a:effectStyleLst>
-      <a:bgFillStyleLst>
-        <a:solidFill>
-          <a:schemeClr val="phClr"/>
-        </a:solidFill>
-        <a:gradFill rotWithShape="1">
-          <a:gsLst>
-            <a:gs pos="0">
-              <a:schemeClr val="phClr">
-                <a:tint val="40000"/>
-                <a:satMod val="350000"/>
-              </a:schemeClr>
-            </a:gs>
-            <a:gs pos="40000">
-              <a:schemeClr val="phClr">
-                <a:tint val="45000"/>
-                <a:shade val="99000"/>
-                <a:satMod val="350000"/>
-              </a:schemeClr>
-            </a:gs>
-            <a:gs pos="100000">
-              <a:schemeClr val="phClr">
-                <a:shade val="20000"/>
-                <a:satMod val="255000"/>
-              </a:schemeClr>
-            </a:gs>
-          </a:gsLst>
-          <a:path path="circle">
-            <a:fillToRect l="50000" t="-80000" r="50000" b="180000"/>
-          </a:path>
-        </a:gradFill>
-        <a:gradFill rotWithShape="1">
-          <a:gsLst>
-            <a:gs pos="0">
-              <a:schemeClr val="phClr">
-                <a:tint val="80000"/>
-                <a:satMod val="300000"/>
-              </a:schemeClr>
-            </a:gs>
-            <a:gs pos="100000">
-              <a:schemeClr val="phClr">
-                <a:shade val="30000"/>
-                <a:satMod val="200000"/>
-              </a:schemeClr>
-            </a:gs>
-          </a:gsLst>
-          <a:path path="circle">
-            <a:fillToRect l="50000" t="50000" r="50000" b="50000"/>
-          </a:path>
-        </a:gradFill>
-      </a:bgFillStyleLst>
-    </a:fmtScheme>
-  </a:themeElements>
-</a:theme>
 </file>
</xml_diff>

<commit_message>
docs: actualización de presentación
</commit_message>
<xml_diff>
--- a/Fase 1/Evidencias Grupales/Presentación Proyecto.pptx
+++ b/Fase 1/Evidencias Grupales/Presentación Proyecto.pptx
@@ -256,7 +256,7 @@
   </p:defaultTextStyle>
   <p:extLst>
     <p:ext uri="GoogleSlidesCustomDataVersion2">
-      <go:slidesCustomData xmlns:go="http://customooxmlschemas.google.com/" r:id="rId14" roundtripDataSignature="AMtx7mjciq7F2ZbWL0aBdal0DO+gswecqw=="/>
+      <go:slidesCustomData xmlns:go="http://customooxmlschemas.google.com/" r:id="rId14" roundtripDataSignature="AMtx7mjfwKDWFdOT1/ghW14nrPDcJmKxMg=="/>
     </p:ext>
   </p:extLst>
 </p:presentation>
@@ -19802,8 +19802,8 @@
         </p:blipFill>
         <p:spPr>
           <a:xfrm>
-            <a:off x="1961475" y="1255400"/>
-            <a:ext cx="8269050" cy="5268799"/>
+            <a:off x="3014000" y="1074775"/>
+            <a:ext cx="6113550" cy="5575900"/>
           </a:xfrm>
           <a:prstGeom prst="rect">
             <a:avLst/>

</xml_diff>